<commit_message>
suppression .bak + maj diapo
</commit_message>
<xml_diff>
--- a/oral_projet/revue_2/diaporama_revue_2_samuel.pptx
+++ b/oral_projet/revue_2/diaporama_revue_2_samuel.pptx
@@ -221,7 +221,7 @@
           <a:p>
             <a:fld id="{7BEC4371-174F-4615-858D-8B61BA547698}" type="datetimeFigureOut">
               <a:rPr lang="fr-FR" smtClean="0"/>
-              <a:t>13/03/2018</a:t>
+              <a:t>15/03/2018</a:t>
             </a:fld>
             <a:endParaRPr lang="fr-FR"/>
           </a:p>
@@ -635,7 +635,7 @@
           <a:p>
             <a:fld id="{125942D7-A464-4365-815E-3C7EAFC3F152}" type="datetimeFigureOut">
               <a:rPr lang="fr-FR" smtClean="0"/>
-              <a:t>13/03/2018</a:t>
+              <a:t>15/03/2018</a:t>
             </a:fld>
             <a:endParaRPr lang="fr-FR"/>
           </a:p>
@@ -845,7 +845,7 @@
           <a:p>
             <a:fld id="{125942D7-A464-4365-815E-3C7EAFC3F152}" type="datetimeFigureOut">
               <a:rPr lang="fr-FR" smtClean="0"/>
-              <a:t>13/03/2018</a:t>
+              <a:t>15/03/2018</a:t>
             </a:fld>
             <a:endParaRPr lang="fr-FR"/>
           </a:p>
@@ -1065,7 +1065,7 @@
           <a:p>
             <a:fld id="{125942D7-A464-4365-815E-3C7EAFC3F152}" type="datetimeFigureOut">
               <a:rPr lang="fr-FR" smtClean="0"/>
-              <a:t>13/03/2018</a:t>
+              <a:t>15/03/2018</a:t>
             </a:fld>
             <a:endParaRPr lang="fr-FR"/>
           </a:p>
@@ -1275,7 +1275,7 @@
           <a:p>
             <a:fld id="{125942D7-A464-4365-815E-3C7EAFC3F152}" type="datetimeFigureOut">
               <a:rPr lang="fr-FR" smtClean="0"/>
-              <a:t>13/03/2018</a:t>
+              <a:t>15/03/2018</a:t>
             </a:fld>
             <a:endParaRPr lang="fr-FR"/>
           </a:p>
@@ -1562,7 +1562,7 @@
           <a:p>
             <a:fld id="{125942D7-A464-4365-815E-3C7EAFC3F152}" type="datetimeFigureOut">
               <a:rPr lang="fr-FR" smtClean="0"/>
-              <a:t>13/03/2018</a:t>
+              <a:t>15/03/2018</a:t>
             </a:fld>
             <a:endParaRPr lang="fr-FR"/>
           </a:p>
@@ -1839,7 +1839,7 @@
           <a:p>
             <a:fld id="{125942D7-A464-4365-815E-3C7EAFC3F152}" type="datetimeFigureOut">
               <a:rPr lang="fr-FR" smtClean="0"/>
-              <a:t>13/03/2018</a:t>
+              <a:t>15/03/2018</a:t>
             </a:fld>
             <a:endParaRPr lang="fr-FR"/>
           </a:p>
@@ -2263,7 +2263,7 @@
           <a:p>
             <a:fld id="{125942D7-A464-4365-815E-3C7EAFC3F152}" type="datetimeFigureOut">
               <a:rPr lang="fr-FR" smtClean="0"/>
-              <a:t>13/03/2018</a:t>
+              <a:t>15/03/2018</a:t>
             </a:fld>
             <a:endParaRPr lang="fr-FR"/>
           </a:p>
@@ -2416,7 +2416,7 @@
           <a:p>
             <a:fld id="{125942D7-A464-4365-815E-3C7EAFC3F152}" type="datetimeFigureOut">
               <a:rPr lang="fr-FR" smtClean="0"/>
-              <a:t>13/03/2018</a:t>
+              <a:t>15/03/2018</a:t>
             </a:fld>
             <a:endParaRPr lang="fr-FR"/>
           </a:p>
@@ -2541,7 +2541,7 @@
           <a:p>
             <a:fld id="{125942D7-A464-4365-815E-3C7EAFC3F152}" type="datetimeFigureOut">
               <a:rPr lang="fr-FR" smtClean="0"/>
-              <a:t>13/03/2018</a:t>
+              <a:t>15/03/2018</a:t>
             </a:fld>
             <a:endParaRPr lang="fr-FR"/>
           </a:p>
@@ -2864,7 +2864,7 @@
           <a:p>
             <a:fld id="{125942D7-A464-4365-815E-3C7EAFC3F152}" type="datetimeFigureOut">
               <a:rPr lang="fr-FR" smtClean="0"/>
-              <a:t>13/03/2018</a:t>
+              <a:t>15/03/2018</a:t>
             </a:fld>
             <a:endParaRPr lang="fr-FR"/>
           </a:p>
@@ -3164,7 +3164,7 @@
           <a:p>
             <a:fld id="{125942D7-A464-4365-815E-3C7EAFC3F152}" type="datetimeFigureOut">
               <a:rPr lang="fr-FR" smtClean="0"/>
-              <a:t>13/03/2018</a:t>
+              <a:t>15/03/2018</a:t>
             </a:fld>
             <a:endParaRPr lang="fr-FR"/>
           </a:p>
@@ -3417,7 +3417,7 @@
           <a:p>
             <a:fld id="{125942D7-A464-4365-815E-3C7EAFC3F152}" type="datetimeFigureOut">
               <a:rPr lang="fr-FR" smtClean="0"/>
-              <a:t>13/03/2018</a:t>
+              <a:t>15/03/2018</a:t>
             </a:fld>
             <a:endParaRPr lang="fr-FR"/>
           </a:p>
@@ -9414,6 +9414,42 @@
           </a:fontRef>
         </p:style>
       </p:cxnSp>
+      <p:pic>
+        <p:nvPicPr>
+          <p:cNvPr id="5" name="Image 4">
+            <a:extLst>
+              <a:ext uri="{FF2B5EF4-FFF2-40B4-BE49-F238E27FC236}">
+                <a16:creationId xmlns:a16="http://schemas.microsoft.com/office/drawing/2014/main" id="{7252AD94-6FD6-48DB-8797-5FCABFDECB76}"/>
+              </a:ext>
+            </a:extLst>
+          </p:cNvPr>
+          <p:cNvPicPr>
+            <a:picLocks noChangeAspect="1"/>
+          </p:cNvPicPr>
+          <p:nvPr/>
+        </p:nvPicPr>
+        <p:blipFill>
+          <a:blip r:embed="rId4">
+            <a:extLst>
+              <a:ext uri="{28A0092B-C50C-407E-A947-70E740481C1C}">
+                <a14:useLocalDpi xmlns:a14="http://schemas.microsoft.com/office/drawing/2010/main" val="0"/>
+              </a:ext>
+            </a:extLst>
+          </a:blip>
+          <a:stretch>
+            <a:fillRect/>
+          </a:stretch>
+        </p:blipFill>
+        <p:spPr>
+          <a:xfrm>
+            <a:off x="1292750" y="1102369"/>
+            <a:ext cx="9390425" cy="5179070"/>
+          </a:xfrm>
+          <a:prstGeom prst="rect">
+            <a:avLst/>
+          </a:prstGeom>
+        </p:spPr>
+      </p:pic>
       <p:sp>
         <p:nvSpPr>
           <p:cNvPr id="2" name="ZoneTexte 1">
@@ -9428,7 +9464,7 @@
         </p:nvSpPr>
         <p:spPr>
           <a:xfrm>
-            <a:off x="3759673" y="523056"/>
+            <a:off x="3759673" y="454801"/>
             <a:ext cx="4675598" cy="769441"/>
           </a:xfrm>
           <a:prstGeom prst="rect">
@@ -9479,42 +9515,6 @@
           </a:p>
         </p:txBody>
       </p:sp>
-      <p:pic>
-        <p:nvPicPr>
-          <p:cNvPr id="4" name="Image 3">
-            <a:extLst>
-              <a:ext uri="{FF2B5EF4-FFF2-40B4-BE49-F238E27FC236}">
-                <a16:creationId xmlns:a16="http://schemas.microsoft.com/office/drawing/2014/main" id="{8B26BEA2-EF2C-479A-B8FC-3E647E6B0735}"/>
-              </a:ext>
-            </a:extLst>
-          </p:cNvPr>
-          <p:cNvPicPr>
-            <a:picLocks noChangeAspect="1"/>
-          </p:cNvPicPr>
-          <p:nvPr/>
-        </p:nvPicPr>
-        <p:blipFill>
-          <a:blip r:embed="rId4">
-            <a:extLst>
-              <a:ext uri="{28A0092B-C50C-407E-A947-70E740481C1C}">
-                <a14:useLocalDpi xmlns:a14="http://schemas.microsoft.com/office/drawing/2010/main" val="0"/>
-              </a:ext>
-            </a:extLst>
-          </a:blip>
-          <a:stretch>
-            <a:fillRect/>
-          </a:stretch>
-        </p:blipFill>
-        <p:spPr>
-          <a:xfrm>
-            <a:off x="1407632" y="1434502"/>
-            <a:ext cx="10145003" cy="5253048"/>
-          </a:xfrm>
-          <a:prstGeom prst="rect">
-            <a:avLst/>
-          </a:prstGeom>
-        </p:spPr>
-      </p:pic>
     </p:spTree>
     <p:extLst>
       <p:ext uri="{BB962C8B-B14F-4D97-AF65-F5344CB8AC3E}">
@@ -24204,10 +24204,10 @@
       </p:grpSpPr>
       <p:pic>
         <p:nvPicPr>
-          <p:cNvPr id="4" name="Image 3">
-            <a:extLst>
-              <a:ext uri="{FF2B5EF4-FFF2-40B4-BE49-F238E27FC236}">
-                <a16:creationId xmlns:a16="http://schemas.microsoft.com/office/drawing/2014/main" id="{E37426A9-7BFE-48C0-9D3A-8DC44C296530}"/>
+          <p:cNvPr id="8" name="Image 7">
+            <a:extLst>
+              <a:ext uri="{FF2B5EF4-FFF2-40B4-BE49-F238E27FC236}">
+                <a16:creationId xmlns:a16="http://schemas.microsoft.com/office/drawing/2014/main" id="{2BB825C5-31DA-4A56-85EA-536DBF510A31}"/>
               </a:ext>
             </a:extLst>
           </p:cNvPr>
@@ -24230,8 +24230,8 @@
         </p:blipFill>
         <p:spPr>
           <a:xfrm>
-            <a:off x="1499694" y="1273084"/>
-            <a:ext cx="9192611" cy="5518459"/>
+            <a:off x="1068751" y="66457"/>
+            <a:ext cx="1259497" cy="776690"/>
           </a:xfrm>
           <a:prstGeom prst="rect">
             <a:avLst/>
@@ -24240,10 +24240,10 @@
       </p:pic>
       <p:pic>
         <p:nvPicPr>
-          <p:cNvPr id="8" name="Image 7">
-            <a:extLst>
-              <a:ext uri="{FF2B5EF4-FFF2-40B4-BE49-F238E27FC236}">
-                <a16:creationId xmlns:a16="http://schemas.microsoft.com/office/drawing/2014/main" id="{2BB825C5-31DA-4A56-85EA-536DBF510A31}"/>
+          <p:cNvPr id="10" name="Image 9">
+            <a:extLst>
+              <a:ext uri="{FF2B5EF4-FFF2-40B4-BE49-F238E27FC236}">
+                <a16:creationId xmlns:a16="http://schemas.microsoft.com/office/drawing/2014/main" id="{8EE7436F-49F2-41E0-93E4-D247B4705294}"/>
               </a:ext>
             </a:extLst>
           </p:cNvPr>
@@ -24266,20 +24266,362 @@
         </p:blipFill>
         <p:spPr>
           <a:xfrm>
-            <a:off x="1068751" y="66457"/>
-            <a:ext cx="1259497" cy="776690"/>
+            <a:off x="9681085" y="238153"/>
+            <a:ext cx="1802101" cy="569807"/>
           </a:xfrm>
           <a:prstGeom prst="rect">
             <a:avLst/>
           </a:prstGeom>
         </p:spPr>
       </p:pic>
+      <p:cxnSp>
+        <p:nvCxnSpPr>
+          <p:cNvPr id="16" name="Connecteur droit 15">
+            <a:extLst>
+              <a:ext uri="{FF2B5EF4-FFF2-40B4-BE49-F238E27FC236}">
+                <a16:creationId xmlns:a16="http://schemas.microsoft.com/office/drawing/2014/main" id="{7319284A-BD6F-4A96-8E2B-E0A4B52E53C6}"/>
+              </a:ext>
+            </a:extLst>
+          </p:cNvPr>
+          <p:cNvCxnSpPr>
+            <a:cxnSpLocks/>
+          </p:cNvCxnSpPr>
+          <p:nvPr/>
+        </p:nvCxnSpPr>
+        <p:spPr>
+          <a:xfrm flipV="1">
+            <a:off x="0" y="454803"/>
+            <a:ext cx="738231" cy="1798"/>
+          </a:xfrm>
+          <a:prstGeom prst="line">
+            <a:avLst/>
+          </a:prstGeom>
+        </p:spPr>
+        <p:style>
+          <a:lnRef idx="3">
+            <a:schemeClr val="dk1"/>
+          </a:lnRef>
+          <a:fillRef idx="0">
+            <a:schemeClr val="dk1"/>
+          </a:fillRef>
+          <a:effectRef idx="2">
+            <a:schemeClr val="dk1"/>
+          </a:effectRef>
+          <a:fontRef idx="minor">
+            <a:schemeClr val="tx1"/>
+          </a:fontRef>
+        </p:style>
+      </p:cxnSp>
+      <p:cxnSp>
+        <p:nvCxnSpPr>
+          <p:cNvPr id="20" name="Connecteur droit 19">
+            <a:extLst>
+              <a:ext uri="{FF2B5EF4-FFF2-40B4-BE49-F238E27FC236}">
+                <a16:creationId xmlns:a16="http://schemas.microsoft.com/office/drawing/2014/main" id="{08874CF7-F149-4C81-B61E-74E18342BA8A}"/>
+              </a:ext>
+            </a:extLst>
+          </p:cNvPr>
+          <p:cNvCxnSpPr>
+            <a:cxnSpLocks/>
+          </p:cNvCxnSpPr>
+          <p:nvPr/>
+        </p:nvCxnSpPr>
+        <p:spPr>
+          <a:xfrm>
+            <a:off x="2573222" y="454803"/>
+            <a:ext cx="6829482" cy="10398"/>
+          </a:xfrm>
+          <a:prstGeom prst="line">
+            <a:avLst/>
+          </a:prstGeom>
+        </p:spPr>
+        <p:style>
+          <a:lnRef idx="3">
+            <a:schemeClr val="dk1"/>
+          </a:lnRef>
+          <a:fillRef idx="0">
+            <a:schemeClr val="dk1"/>
+          </a:fillRef>
+          <a:effectRef idx="2">
+            <a:schemeClr val="dk1"/>
+          </a:effectRef>
+          <a:fontRef idx="minor">
+            <a:schemeClr val="tx1"/>
+          </a:fontRef>
+        </p:style>
+      </p:cxnSp>
+      <p:cxnSp>
+        <p:nvCxnSpPr>
+          <p:cNvPr id="26" name="Connecteur droit 25">
+            <a:extLst>
+              <a:ext uri="{FF2B5EF4-FFF2-40B4-BE49-F238E27FC236}">
+                <a16:creationId xmlns:a16="http://schemas.microsoft.com/office/drawing/2014/main" id="{BB3B35CC-057B-48C1-880F-3306A6559175}"/>
+              </a:ext>
+            </a:extLst>
+          </p:cNvPr>
+          <p:cNvCxnSpPr>
+            <a:cxnSpLocks/>
+          </p:cNvCxnSpPr>
+          <p:nvPr/>
+        </p:nvCxnSpPr>
+        <p:spPr>
+          <a:xfrm>
+            <a:off x="738231" y="454803"/>
+            <a:ext cx="344203" cy="484764"/>
+          </a:xfrm>
+          <a:prstGeom prst="line">
+            <a:avLst/>
+          </a:prstGeom>
+        </p:spPr>
+        <p:style>
+          <a:lnRef idx="3">
+            <a:schemeClr val="dk1"/>
+          </a:lnRef>
+          <a:fillRef idx="0">
+            <a:schemeClr val="dk1"/>
+          </a:fillRef>
+          <a:effectRef idx="2">
+            <a:schemeClr val="dk1"/>
+          </a:effectRef>
+          <a:fontRef idx="minor">
+            <a:schemeClr val="tx1"/>
+          </a:fontRef>
+        </p:style>
+      </p:cxnSp>
+      <p:cxnSp>
+        <p:nvCxnSpPr>
+          <p:cNvPr id="32" name="Connecteur droit 31">
+            <a:extLst>
+              <a:ext uri="{FF2B5EF4-FFF2-40B4-BE49-F238E27FC236}">
+                <a16:creationId xmlns:a16="http://schemas.microsoft.com/office/drawing/2014/main" id="{4AD96496-1EB6-4E48-9BB2-5C255495C686}"/>
+              </a:ext>
+            </a:extLst>
+          </p:cNvPr>
+          <p:cNvCxnSpPr>
+            <a:cxnSpLocks/>
+          </p:cNvCxnSpPr>
+          <p:nvPr/>
+        </p:nvCxnSpPr>
+        <p:spPr>
+          <a:xfrm>
+            <a:off x="1082434" y="938268"/>
+            <a:ext cx="1146585" cy="0"/>
+          </a:xfrm>
+          <a:prstGeom prst="line">
+            <a:avLst/>
+          </a:prstGeom>
+        </p:spPr>
+        <p:style>
+          <a:lnRef idx="3">
+            <a:schemeClr val="dk1"/>
+          </a:lnRef>
+          <a:fillRef idx="0">
+            <a:schemeClr val="dk1"/>
+          </a:fillRef>
+          <a:effectRef idx="2">
+            <a:schemeClr val="dk1"/>
+          </a:effectRef>
+          <a:fontRef idx="minor">
+            <a:schemeClr val="tx1"/>
+          </a:fontRef>
+        </p:style>
+      </p:cxnSp>
+      <p:cxnSp>
+        <p:nvCxnSpPr>
+          <p:cNvPr id="51" name="Connecteur droit 50">
+            <a:extLst>
+              <a:ext uri="{FF2B5EF4-FFF2-40B4-BE49-F238E27FC236}">
+                <a16:creationId xmlns:a16="http://schemas.microsoft.com/office/drawing/2014/main" id="{C035BFA6-ECBF-4775-BA81-19D2CA41AA8D}"/>
+              </a:ext>
+            </a:extLst>
+          </p:cNvPr>
+          <p:cNvCxnSpPr>
+            <a:cxnSpLocks/>
+          </p:cNvCxnSpPr>
+          <p:nvPr/>
+        </p:nvCxnSpPr>
+        <p:spPr>
+          <a:xfrm>
+            <a:off x="9402704" y="465201"/>
+            <a:ext cx="344203" cy="495163"/>
+          </a:xfrm>
+          <a:prstGeom prst="line">
+            <a:avLst/>
+          </a:prstGeom>
+        </p:spPr>
+        <p:style>
+          <a:lnRef idx="3">
+            <a:schemeClr val="dk1"/>
+          </a:lnRef>
+          <a:fillRef idx="0">
+            <a:schemeClr val="dk1"/>
+          </a:fillRef>
+          <a:effectRef idx="2">
+            <a:schemeClr val="dk1"/>
+          </a:effectRef>
+          <a:fontRef idx="minor">
+            <a:schemeClr val="tx1"/>
+          </a:fontRef>
+        </p:style>
+      </p:cxnSp>
+      <p:cxnSp>
+        <p:nvCxnSpPr>
+          <p:cNvPr id="52" name="Connecteur droit 51">
+            <a:extLst>
+              <a:ext uri="{FF2B5EF4-FFF2-40B4-BE49-F238E27FC236}">
+                <a16:creationId xmlns:a16="http://schemas.microsoft.com/office/drawing/2014/main" id="{FA310BC7-694B-4984-99A2-61A1F4F6EBF9}"/>
+              </a:ext>
+            </a:extLst>
+          </p:cNvPr>
+          <p:cNvCxnSpPr>
+            <a:cxnSpLocks/>
+          </p:cNvCxnSpPr>
+          <p:nvPr/>
+        </p:nvCxnSpPr>
+        <p:spPr>
+          <a:xfrm flipH="1">
+            <a:off x="11370469" y="448308"/>
+            <a:ext cx="364332" cy="501657"/>
+          </a:xfrm>
+          <a:prstGeom prst="line">
+            <a:avLst/>
+          </a:prstGeom>
+        </p:spPr>
+        <p:style>
+          <a:lnRef idx="3">
+            <a:schemeClr val="dk1"/>
+          </a:lnRef>
+          <a:fillRef idx="0">
+            <a:schemeClr val="dk1"/>
+          </a:fillRef>
+          <a:effectRef idx="2">
+            <a:schemeClr val="dk1"/>
+          </a:effectRef>
+          <a:fontRef idx="minor">
+            <a:schemeClr val="tx1"/>
+          </a:fontRef>
+        </p:style>
+      </p:cxnSp>
+      <p:cxnSp>
+        <p:nvCxnSpPr>
+          <p:cNvPr id="53" name="Connecteur droit 52">
+            <a:extLst>
+              <a:ext uri="{FF2B5EF4-FFF2-40B4-BE49-F238E27FC236}">
+                <a16:creationId xmlns:a16="http://schemas.microsoft.com/office/drawing/2014/main" id="{BE0649BD-EE59-4DDA-960F-95B2572F9F13}"/>
+              </a:ext>
+            </a:extLst>
+          </p:cNvPr>
+          <p:cNvCxnSpPr>
+            <a:cxnSpLocks/>
+          </p:cNvCxnSpPr>
+          <p:nvPr/>
+        </p:nvCxnSpPr>
+        <p:spPr>
+          <a:xfrm>
+            <a:off x="9743203" y="949965"/>
+            <a:ext cx="1627266" cy="0"/>
+          </a:xfrm>
+          <a:prstGeom prst="line">
+            <a:avLst/>
+          </a:prstGeom>
+        </p:spPr>
+        <p:style>
+          <a:lnRef idx="3">
+            <a:schemeClr val="dk1"/>
+          </a:lnRef>
+          <a:fillRef idx="0">
+            <a:schemeClr val="dk1"/>
+          </a:fillRef>
+          <a:effectRef idx="2">
+            <a:schemeClr val="dk1"/>
+          </a:effectRef>
+          <a:fontRef idx="minor">
+            <a:schemeClr val="tx1"/>
+          </a:fontRef>
+        </p:style>
+      </p:cxnSp>
+      <p:cxnSp>
+        <p:nvCxnSpPr>
+          <p:cNvPr id="55" name="Connecteur droit 54">
+            <a:extLst>
+              <a:ext uri="{FF2B5EF4-FFF2-40B4-BE49-F238E27FC236}">
+                <a16:creationId xmlns:a16="http://schemas.microsoft.com/office/drawing/2014/main" id="{52AA9200-DAFA-4EEF-AC13-4C7CE82A59EC}"/>
+              </a:ext>
+            </a:extLst>
+          </p:cNvPr>
+          <p:cNvCxnSpPr>
+            <a:cxnSpLocks/>
+          </p:cNvCxnSpPr>
+          <p:nvPr/>
+        </p:nvCxnSpPr>
+        <p:spPr>
+          <a:xfrm>
+            <a:off x="11715750" y="454801"/>
+            <a:ext cx="476249" cy="10400"/>
+          </a:xfrm>
+          <a:prstGeom prst="line">
+            <a:avLst/>
+          </a:prstGeom>
+        </p:spPr>
+        <p:style>
+          <a:lnRef idx="3">
+            <a:schemeClr val="dk1"/>
+          </a:lnRef>
+          <a:fillRef idx="0">
+            <a:schemeClr val="dk1"/>
+          </a:fillRef>
+          <a:effectRef idx="2">
+            <a:schemeClr val="dk1"/>
+          </a:effectRef>
+          <a:fontRef idx="minor">
+            <a:schemeClr val="tx1"/>
+          </a:fontRef>
+        </p:style>
+      </p:cxnSp>
+      <p:cxnSp>
+        <p:nvCxnSpPr>
+          <p:cNvPr id="23" name="Connecteur droit 22">
+            <a:extLst>
+              <a:ext uri="{FF2B5EF4-FFF2-40B4-BE49-F238E27FC236}">
+                <a16:creationId xmlns:a16="http://schemas.microsoft.com/office/drawing/2014/main" id="{BCB092C8-0080-4E56-957E-0046D4C83988}"/>
+              </a:ext>
+            </a:extLst>
+          </p:cNvPr>
+          <p:cNvCxnSpPr>
+            <a:cxnSpLocks/>
+          </p:cNvCxnSpPr>
+          <p:nvPr/>
+        </p:nvCxnSpPr>
+        <p:spPr>
+          <a:xfrm flipH="1">
+            <a:off x="2216372" y="446356"/>
+            <a:ext cx="364332" cy="501657"/>
+          </a:xfrm>
+          <a:prstGeom prst="line">
+            <a:avLst/>
+          </a:prstGeom>
+        </p:spPr>
+        <p:style>
+          <a:lnRef idx="3">
+            <a:schemeClr val="dk1"/>
+          </a:lnRef>
+          <a:fillRef idx="0">
+            <a:schemeClr val="dk1"/>
+          </a:fillRef>
+          <a:effectRef idx="2">
+            <a:schemeClr val="dk1"/>
+          </a:effectRef>
+          <a:fontRef idx="minor">
+            <a:schemeClr val="tx1"/>
+          </a:fontRef>
+        </p:style>
+      </p:cxnSp>
       <p:pic>
         <p:nvPicPr>
-          <p:cNvPr id="10" name="Image 9">
-            <a:extLst>
-              <a:ext uri="{FF2B5EF4-FFF2-40B4-BE49-F238E27FC236}">
-                <a16:creationId xmlns:a16="http://schemas.microsoft.com/office/drawing/2014/main" id="{8EE7436F-49F2-41E0-93E4-D247B4705294}"/>
+          <p:cNvPr id="57" name="Image 56">
+            <a:extLst>
+              <a:ext uri="{FF2B5EF4-FFF2-40B4-BE49-F238E27FC236}">
+                <a16:creationId xmlns:a16="http://schemas.microsoft.com/office/drawing/2014/main" id="{12B16FB2-5844-4B92-AE69-9BAC858C22BB}"/>
               </a:ext>
             </a:extLst>
           </p:cNvPr>
@@ -24289,385 +24631,7 @@
           <p:nvPr/>
         </p:nvPicPr>
         <p:blipFill>
-          <a:blip r:embed="rId4">
-            <a:extLst>
-              <a:ext uri="{28A0092B-C50C-407E-A947-70E740481C1C}">
-                <a14:useLocalDpi xmlns:a14="http://schemas.microsoft.com/office/drawing/2010/main" val="0"/>
-              </a:ext>
-            </a:extLst>
-          </a:blip>
-          <a:stretch>
-            <a:fillRect/>
-          </a:stretch>
-        </p:blipFill>
-        <p:spPr>
-          <a:xfrm>
-            <a:off x="9681085" y="238153"/>
-            <a:ext cx="1802101" cy="569807"/>
-          </a:xfrm>
-          <a:prstGeom prst="rect">
-            <a:avLst/>
-          </a:prstGeom>
-        </p:spPr>
-      </p:pic>
-      <p:cxnSp>
-        <p:nvCxnSpPr>
-          <p:cNvPr id="16" name="Connecteur droit 15">
-            <a:extLst>
-              <a:ext uri="{FF2B5EF4-FFF2-40B4-BE49-F238E27FC236}">
-                <a16:creationId xmlns:a16="http://schemas.microsoft.com/office/drawing/2014/main" id="{7319284A-BD6F-4A96-8E2B-E0A4B52E53C6}"/>
-              </a:ext>
-            </a:extLst>
-          </p:cNvPr>
-          <p:cNvCxnSpPr>
-            <a:cxnSpLocks/>
-          </p:cNvCxnSpPr>
-          <p:nvPr/>
-        </p:nvCxnSpPr>
-        <p:spPr>
-          <a:xfrm flipV="1">
-            <a:off x="0" y="454803"/>
-            <a:ext cx="738231" cy="1798"/>
-          </a:xfrm>
-          <a:prstGeom prst="line">
-            <a:avLst/>
-          </a:prstGeom>
-        </p:spPr>
-        <p:style>
-          <a:lnRef idx="3">
-            <a:schemeClr val="dk1"/>
-          </a:lnRef>
-          <a:fillRef idx="0">
-            <a:schemeClr val="dk1"/>
-          </a:fillRef>
-          <a:effectRef idx="2">
-            <a:schemeClr val="dk1"/>
-          </a:effectRef>
-          <a:fontRef idx="minor">
-            <a:schemeClr val="tx1"/>
-          </a:fontRef>
-        </p:style>
-      </p:cxnSp>
-      <p:cxnSp>
-        <p:nvCxnSpPr>
-          <p:cNvPr id="20" name="Connecteur droit 19">
-            <a:extLst>
-              <a:ext uri="{FF2B5EF4-FFF2-40B4-BE49-F238E27FC236}">
-                <a16:creationId xmlns:a16="http://schemas.microsoft.com/office/drawing/2014/main" id="{08874CF7-F149-4C81-B61E-74E18342BA8A}"/>
-              </a:ext>
-            </a:extLst>
-          </p:cNvPr>
-          <p:cNvCxnSpPr>
-            <a:cxnSpLocks/>
-          </p:cNvCxnSpPr>
-          <p:nvPr/>
-        </p:nvCxnSpPr>
-        <p:spPr>
-          <a:xfrm>
-            <a:off x="2573222" y="454803"/>
-            <a:ext cx="6829482" cy="10398"/>
-          </a:xfrm>
-          <a:prstGeom prst="line">
-            <a:avLst/>
-          </a:prstGeom>
-        </p:spPr>
-        <p:style>
-          <a:lnRef idx="3">
-            <a:schemeClr val="dk1"/>
-          </a:lnRef>
-          <a:fillRef idx="0">
-            <a:schemeClr val="dk1"/>
-          </a:fillRef>
-          <a:effectRef idx="2">
-            <a:schemeClr val="dk1"/>
-          </a:effectRef>
-          <a:fontRef idx="minor">
-            <a:schemeClr val="tx1"/>
-          </a:fontRef>
-        </p:style>
-      </p:cxnSp>
-      <p:cxnSp>
-        <p:nvCxnSpPr>
-          <p:cNvPr id="26" name="Connecteur droit 25">
-            <a:extLst>
-              <a:ext uri="{FF2B5EF4-FFF2-40B4-BE49-F238E27FC236}">
-                <a16:creationId xmlns:a16="http://schemas.microsoft.com/office/drawing/2014/main" id="{BB3B35CC-057B-48C1-880F-3306A6559175}"/>
-              </a:ext>
-            </a:extLst>
-          </p:cNvPr>
-          <p:cNvCxnSpPr>
-            <a:cxnSpLocks/>
-          </p:cNvCxnSpPr>
-          <p:nvPr/>
-        </p:nvCxnSpPr>
-        <p:spPr>
-          <a:xfrm>
-            <a:off x="738231" y="454803"/>
-            <a:ext cx="344203" cy="484764"/>
-          </a:xfrm>
-          <a:prstGeom prst="line">
-            <a:avLst/>
-          </a:prstGeom>
-        </p:spPr>
-        <p:style>
-          <a:lnRef idx="3">
-            <a:schemeClr val="dk1"/>
-          </a:lnRef>
-          <a:fillRef idx="0">
-            <a:schemeClr val="dk1"/>
-          </a:fillRef>
-          <a:effectRef idx="2">
-            <a:schemeClr val="dk1"/>
-          </a:effectRef>
-          <a:fontRef idx="minor">
-            <a:schemeClr val="tx1"/>
-          </a:fontRef>
-        </p:style>
-      </p:cxnSp>
-      <p:cxnSp>
-        <p:nvCxnSpPr>
-          <p:cNvPr id="32" name="Connecteur droit 31">
-            <a:extLst>
-              <a:ext uri="{FF2B5EF4-FFF2-40B4-BE49-F238E27FC236}">
-                <a16:creationId xmlns:a16="http://schemas.microsoft.com/office/drawing/2014/main" id="{4AD96496-1EB6-4E48-9BB2-5C255495C686}"/>
-              </a:ext>
-            </a:extLst>
-          </p:cNvPr>
-          <p:cNvCxnSpPr>
-            <a:cxnSpLocks/>
-          </p:cNvCxnSpPr>
-          <p:nvPr/>
-        </p:nvCxnSpPr>
-        <p:spPr>
-          <a:xfrm>
-            <a:off x="1082434" y="938268"/>
-            <a:ext cx="1146585" cy="0"/>
-          </a:xfrm>
-          <a:prstGeom prst="line">
-            <a:avLst/>
-          </a:prstGeom>
-        </p:spPr>
-        <p:style>
-          <a:lnRef idx="3">
-            <a:schemeClr val="dk1"/>
-          </a:lnRef>
-          <a:fillRef idx="0">
-            <a:schemeClr val="dk1"/>
-          </a:fillRef>
-          <a:effectRef idx="2">
-            <a:schemeClr val="dk1"/>
-          </a:effectRef>
-          <a:fontRef idx="minor">
-            <a:schemeClr val="tx1"/>
-          </a:fontRef>
-        </p:style>
-      </p:cxnSp>
-      <p:cxnSp>
-        <p:nvCxnSpPr>
-          <p:cNvPr id="51" name="Connecteur droit 50">
-            <a:extLst>
-              <a:ext uri="{FF2B5EF4-FFF2-40B4-BE49-F238E27FC236}">
-                <a16:creationId xmlns:a16="http://schemas.microsoft.com/office/drawing/2014/main" id="{C035BFA6-ECBF-4775-BA81-19D2CA41AA8D}"/>
-              </a:ext>
-            </a:extLst>
-          </p:cNvPr>
-          <p:cNvCxnSpPr>
-            <a:cxnSpLocks/>
-          </p:cNvCxnSpPr>
-          <p:nvPr/>
-        </p:nvCxnSpPr>
-        <p:spPr>
-          <a:xfrm>
-            <a:off x="9402704" y="465201"/>
-            <a:ext cx="344203" cy="495163"/>
-          </a:xfrm>
-          <a:prstGeom prst="line">
-            <a:avLst/>
-          </a:prstGeom>
-        </p:spPr>
-        <p:style>
-          <a:lnRef idx="3">
-            <a:schemeClr val="dk1"/>
-          </a:lnRef>
-          <a:fillRef idx="0">
-            <a:schemeClr val="dk1"/>
-          </a:fillRef>
-          <a:effectRef idx="2">
-            <a:schemeClr val="dk1"/>
-          </a:effectRef>
-          <a:fontRef idx="minor">
-            <a:schemeClr val="tx1"/>
-          </a:fontRef>
-        </p:style>
-      </p:cxnSp>
-      <p:cxnSp>
-        <p:nvCxnSpPr>
-          <p:cNvPr id="52" name="Connecteur droit 51">
-            <a:extLst>
-              <a:ext uri="{FF2B5EF4-FFF2-40B4-BE49-F238E27FC236}">
-                <a16:creationId xmlns:a16="http://schemas.microsoft.com/office/drawing/2014/main" id="{FA310BC7-694B-4984-99A2-61A1F4F6EBF9}"/>
-              </a:ext>
-            </a:extLst>
-          </p:cNvPr>
-          <p:cNvCxnSpPr>
-            <a:cxnSpLocks/>
-          </p:cNvCxnSpPr>
-          <p:nvPr/>
-        </p:nvCxnSpPr>
-        <p:spPr>
-          <a:xfrm flipH="1">
-            <a:off x="11370469" y="448308"/>
-            <a:ext cx="364332" cy="501657"/>
-          </a:xfrm>
-          <a:prstGeom prst="line">
-            <a:avLst/>
-          </a:prstGeom>
-        </p:spPr>
-        <p:style>
-          <a:lnRef idx="3">
-            <a:schemeClr val="dk1"/>
-          </a:lnRef>
-          <a:fillRef idx="0">
-            <a:schemeClr val="dk1"/>
-          </a:fillRef>
-          <a:effectRef idx="2">
-            <a:schemeClr val="dk1"/>
-          </a:effectRef>
-          <a:fontRef idx="minor">
-            <a:schemeClr val="tx1"/>
-          </a:fontRef>
-        </p:style>
-      </p:cxnSp>
-      <p:cxnSp>
-        <p:nvCxnSpPr>
-          <p:cNvPr id="53" name="Connecteur droit 52">
-            <a:extLst>
-              <a:ext uri="{FF2B5EF4-FFF2-40B4-BE49-F238E27FC236}">
-                <a16:creationId xmlns:a16="http://schemas.microsoft.com/office/drawing/2014/main" id="{BE0649BD-EE59-4DDA-960F-95B2572F9F13}"/>
-              </a:ext>
-            </a:extLst>
-          </p:cNvPr>
-          <p:cNvCxnSpPr>
-            <a:cxnSpLocks/>
-          </p:cNvCxnSpPr>
-          <p:nvPr/>
-        </p:nvCxnSpPr>
-        <p:spPr>
-          <a:xfrm>
-            <a:off x="9743203" y="949965"/>
-            <a:ext cx="1627266" cy="0"/>
-          </a:xfrm>
-          <a:prstGeom prst="line">
-            <a:avLst/>
-          </a:prstGeom>
-        </p:spPr>
-        <p:style>
-          <a:lnRef idx="3">
-            <a:schemeClr val="dk1"/>
-          </a:lnRef>
-          <a:fillRef idx="0">
-            <a:schemeClr val="dk1"/>
-          </a:fillRef>
-          <a:effectRef idx="2">
-            <a:schemeClr val="dk1"/>
-          </a:effectRef>
-          <a:fontRef idx="minor">
-            <a:schemeClr val="tx1"/>
-          </a:fontRef>
-        </p:style>
-      </p:cxnSp>
-      <p:cxnSp>
-        <p:nvCxnSpPr>
-          <p:cNvPr id="55" name="Connecteur droit 54">
-            <a:extLst>
-              <a:ext uri="{FF2B5EF4-FFF2-40B4-BE49-F238E27FC236}">
-                <a16:creationId xmlns:a16="http://schemas.microsoft.com/office/drawing/2014/main" id="{52AA9200-DAFA-4EEF-AC13-4C7CE82A59EC}"/>
-              </a:ext>
-            </a:extLst>
-          </p:cNvPr>
-          <p:cNvCxnSpPr>
-            <a:cxnSpLocks/>
-          </p:cNvCxnSpPr>
-          <p:nvPr/>
-        </p:nvCxnSpPr>
-        <p:spPr>
-          <a:xfrm>
-            <a:off x="11715750" y="454801"/>
-            <a:ext cx="476249" cy="10400"/>
-          </a:xfrm>
-          <a:prstGeom prst="line">
-            <a:avLst/>
-          </a:prstGeom>
-        </p:spPr>
-        <p:style>
-          <a:lnRef idx="3">
-            <a:schemeClr val="dk1"/>
-          </a:lnRef>
-          <a:fillRef idx="0">
-            <a:schemeClr val="dk1"/>
-          </a:fillRef>
-          <a:effectRef idx="2">
-            <a:schemeClr val="dk1"/>
-          </a:effectRef>
-          <a:fontRef idx="minor">
-            <a:schemeClr val="tx1"/>
-          </a:fontRef>
-        </p:style>
-      </p:cxnSp>
-      <p:cxnSp>
-        <p:nvCxnSpPr>
-          <p:cNvPr id="23" name="Connecteur droit 22">
-            <a:extLst>
-              <a:ext uri="{FF2B5EF4-FFF2-40B4-BE49-F238E27FC236}">
-                <a16:creationId xmlns:a16="http://schemas.microsoft.com/office/drawing/2014/main" id="{BCB092C8-0080-4E56-957E-0046D4C83988}"/>
-              </a:ext>
-            </a:extLst>
-          </p:cNvPr>
-          <p:cNvCxnSpPr>
-            <a:cxnSpLocks/>
-          </p:cNvCxnSpPr>
-          <p:nvPr/>
-        </p:nvCxnSpPr>
-        <p:spPr>
-          <a:xfrm flipH="1">
-            <a:off x="2216372" y="446356"/>
-            <a:ext cx="364332" cy="501657"/>
-          </a:xfrm>
-          <a:prstGeom prst="line">
-            <a:avLst/>
-          </a:prstGeom>
-        </p:spPr>
-        <p:style>
-          <a:lnRef idx="3">
-            <a:schemeClr val="dk1"/>
-          </a:lnRef>
-          <a:fillRef idx="0">
-            <a:schemeClr val="dk1"/>
-          </a:fillRef>
-          <a:effectRef idx="2">
-            <a:schemeClr val="dk1"/>
-          </a:effectRef>
-          <a:fontRef idx="minor">
-            <a:schemeClr val="tx1"/>
-          </a:fontRef>
-        </p:style>
-      </p:cxnSp>
-      <p:pic>
-        <p:nvPicPr>
-          <p:cNvPr id="57" name="Image 56">
-            <a:extLst>
-              <a:ext uri="{FF2B5EF4-FFF2-40B4-BE49-F238E27FC236}">
-                <a16:creationId xmlns:a16="http://schemas.microsoft.com/office/drawing/2014/main" id="{12B16FB2-5844-4B92-AE69-9BAC858C22BB}"/>
-              </a:ext>
-            </a:extLst>
-          </p:cNvPr>
-          <p:cNvPicPr>
-            <a:picLocks noChangeAspect="1"/>
-          </p:cNvPicPr>
-          <p:nvPr/>
-        </p:nvPicPr>
-        <p:blipFill>
-          <a:blip r:embed="rId4">
+          <a:blip r:embed="rId3">
             <a:extLst>
               <a:ext uri="{28A0092B-C50C-407E-A947-70E740481C1C}">
                 <a14:useLocalDpi xmlns:a14="http://schemas.microsoft.com/office/drawing/2010/main" val="0"/>

</xml_diff>